<commit_message>
Add comments and fix minor issues
</commit_message>
<xml_diff>
--- a/Courses/Software-Sciences/IT-Module-4-Problem-Solving-with-ICT/02-Sequential-(Linear)-Models/02-Sequential-(Linear)-Models.pptx
+++ b/Courses/Software-Sciences/IT-Module-4-Problem-Solving-with-ICT/02-Sequential-(Linear)-Models/02-Sequential-(Linear)-Models.pptx
@@ -207,6 +207,12 @@
 </p:presentation>
 </file>
 
+<file path=ppt/authors.xml><?xml version="1.0" encoding="utf-8"?>
+<p188:authorLst xmlns:a="http://schemas.openxmlformats.org/drawingml/2006/main" xmlns:r="http://schemas.openxmlformats.org/officeDocument/2006/relationships" xmlns:p188="http://schemas.microsoft.com/office/powerpoint/2018/8/main">
+  <p188:author id="{CB4BF2F8-D32F-9387-A6CE-368ED6EFDCF0}" name="Zaraliev" initials="KZ" userId="S::Zaraliev@students.softuni.bg::e1c6524a-140e-4108-9ad5-216363431969" providerId="AD"/>
+</p188:authorLst>
+</file>
+
 <file path=ppt/commentAuthors.xml><?xml version="1.0" encoding="utf-8"?>
 <p:cmAuthorLst xmlns:a="http://schemas.openxmlformats.org/drawingml/2006/main" xmlns:r="http://schemas.openxmlformats.org/officeDocument/2006/relationships" xmlns:p="http://schemas.openxmlformats.org/presentationml/2006/main">
   <p:cmAuthor id="1" name="PC" initials="P" lastIdx="8" clrIdx="0">
@@ -224,6 +230,76 @@
     </p:extLst>
   </p:cmAuthor>
 </p:cmAuthorLst>
+</file>
+
+<file path=ppt/comments/modernComment_27B_AA1567F3.xml><?xml version="1.0" encoding="utf-8"?>
+<p188:cmLst xmlns:a="http://schemas.openxmlformats.org/drawingml/2006/main" xmlns:r="http://schemas.openxmlformats.org/officeDocument/2006/relationships" xmlns:p188="http://schemas.microsoft.com/office/powerpoint/2018/8/main">
+  <p188:cm id="{55067D6C-9C5C-4D6E-8E37-79EAA0B75F42}" authorId="{CB4BF2F8-D32F-9387-A6CE-368ED6EFDCF0}" created="2025-05-05T11:25:44.480">
+    <ac:txMkLst xmlns:ac="http://schemas.microsoft.com/office/drawing/2013/main/command">
+      <pc:docMk xmlns:pc="http://schemas.microsoft.com/office/powerpoint/2013/main/command"/>
+      <pc:sldMk xmlns:pc="http://schemas.microsoft.com/office/powerpoint/2013/main/command" cId="2853529587" sldId="635"/>
+      <ac:spMk id="7" creationId="{320B2856-CE5E-4934-BD1C-1D81E68E529A}"/>
+      <ac:txMk cp="0" len="11">
+        <ac:context len="195" hash="3414224213"/>
+      </ac:txMk>
+    </ac:txMkLst>
+    <p188:pos x="2907800" y="288430"/>
+    <p188:txBody>
+      <a:bodyPr/>
+      <a:lstStyle/>
+      <a:p>
+        <a:r>
+          <a:rPr lang="en-GB"/>
+          <a:t>Най-ранният - да се промени, така че да стане ясно, че е един от първите</a:t>
+        </a:r>
+      </a:p>
+    </p188:txBody>
+  </p188:cm>
+</p188:cmLst>
+</file>
+
+<file path=ppt/comments/modernComment_27F_46FE35A3.xml><?xml version="1.0" encoding="utf-8"?>
+<p188:cmLst xmlns:a="http://schemas.openxmlformats.org/drawingml/2006/main" xmlns:r="http://schemas.openxmlformats.org/officeDocument/2006/relationships" xmlns:p188="http://schemas.microsoft.com/office/powerpoint/2018/8/main">
+  <p188:cm id="{3163D514-7152-43B7-A92C-7DE62F4D61AF}" authorId="{CB4BF2F8-D32F-9387-A6CE-368ED6EFDCF0}" created="2025-05-05T11:06:06.622">
+    <ac:deMkLst xmlns:ac="http://schemas.microsoft.com/office/drawing/2013/main/command">
+      <pc:docMk xmlns:pc="http://schemas.microsoft.com/office/powerpoint/2013/main/command"/>
+      <pc:sldMk xmlns:pc="http://schemas.microsoft.com/office/powerpoint/2013/main/command" cId="1191064995" sldId="639"/>
+      <ac:picMk id="5" creationId="{0C081F42-75B0-4521-F391-8003B1B104FA}"/>
+    </ac:deMkLst>
+    <p188:txBody>
+      <a:bodyPr/>
+      <a:lstStyle/>
+      <a:p>
+        <a:r>
+          <a:rPr lang="en-GB"/>
+          <a:t>Смени го с лого на Asana</a:t>
+        </a:r>
+      </a:p>
+    </p188:txBody>
+  </p188:cm>
+</p188:cmLst>
+</file>
+
+<file path=ppt/comments/modernComment_282_4759DF7A.xml><?xml version="1.0" encoding="utf-8"?>
+<p188:cmLst xmlns:a="http://schemas.openxmlformats.org/drawingml/2006/main" xmlns:r="http://schemas.openxmlformats.org/officeDocument/2006/relationships" xmlns:p188="http://schemas.microsoft.com/office/powerpoint/2018/8/main">
+  <p188:cm id="{54D36083-C454-47BB-80F9-B3F6B27169C7}" authorId="{CB4BF2F8-D32F-9387-A6CE-368ED6EFDCF0}" created="2025-05-05T11:28:30.765">
+    <ac:deMkLst xmlns:ac="http://schemas.microsoft.com/office/drawing/2013/main/command">
+      <pc:docMk xmlns:pc="http://schemas.microsoft.com/office/powerpoint/2013/main/command"/>
+      <pc:sldMk xmlns:pc="http://schemas.microsoft.com/office/powerpoint/2013/main/command" cId="1197072250" sldId="642"/>
+      <ac:picMk id="3" creationId="{002AC75E-C6D3-E916-CF7C-2A65E838E1EC}"/>
+    </ac:deMkLst>
+    <p188:txBody>
+      <a:bodyPr/>
+      <a:lstStyle/>
+      <a:p>
+        <a:r>
+          <a:rPr lang="en-GB"/>
+          <a:t>Същата снимка е, както и при миналия слайд</a:t>
+        </a:r>
+      </a:p>
+    </p188:txBody>
+  </p188:cm>
+</p188:cmLst>
 </file>
 
 <file path=ppt/handoutMasters/handoutMaster1.xml><?xml version="1.0" encoding="utf-8"?>
@@ -320,7 +396,7 @@
           <a:p>
             <a:fld id="{4E087215-0C8F-4762-A664-737A353EC9A4}" type="datetimeFigureOut">
               <a:rPr lang="bg-BG" smtClean="0"/>
-              <a:t>27.03.25 г.</a:t>
+              <a:t>5.5.2025 г.</a:t>
             </a:fld>
             <a:endParaRPr lang="bg-BG"/>
           </a:p>
@@ -516,7 +592,7 @@
           <a:p>
             <a:fld id="{72D84649-876A-46C9-8472-14CB09C070D8}" type="datetimeFigureOut">
               <a:rPr lang="en-US" smtClean="0"/>
-              <a:t>3/27/25</a:t>
+              <a:t>5/5/2025</a:t>
             </a:fld>
             <a:endParaRPr lang="en-US"/>
           </a:p>
@@ -10822,7 +10898,7 @@
           <p:nvPr/>
         </p:nvPicPr>
         <p:blipFill>
-          <a:blip r:embed="rId3">
+          <a:blip r:embed="rId4">
             <a:extLst>
               <a:ext uri="{28A0092B-C50C-407E-A947-70E740481C1C}">
                 <a14:useLocalDpi xmlns:a14="http://schemas.microsoft.com/office/drawing/2010/main" val="0"/>
@@ -11038,6 +11114,11 @@
       </p:par>
     </p:tnLst>
   </p:timing>
+  <p:extLst>
+    <p:ext uri="{6950BFC3-D8DA-4A85-94F7-54DA5524770B}">
+      <p188:commentRel xmlns:p188="http://schemas.microsoft.com/office/powerpoint/2018/8/main" r:id="rId3"/>
+    </p:ext>
+  </p:extLst>
 </p:sld>
 </file>
 
@@ -11822,7 +11903,7 @@
           <p:nvPr/>
         </p:nvPicPr>
         <p:blipFill rotWithShape="1">
-          <a:blip r:embed="rId3">
+          <a:blip r:embed="rId4">
             <a:extLst>
               <a:ext uri="{28A0092B-C50C-407E-A947-70E740481C1C}">
                 <a14:useLocalDpi xmlns:a14="http://schemas.microsoft.com/office/drawing/2010/main" val="0"/>
@@ -11860,6 +11941,11 @@
       <p:transition spd="slow" advClick="0" advTm="5000"/>
     </mc:Fallback>
   </mc:AlternateContent>
+  <p:extLst>
+    <p:ext uri="{6950BFC3-D8DA-4A85-94F7-54DA5524770B}">
+      <p188:commentRel xmlns:p188="http://schemas.microsoft.com/office/powerpoint/2018/8/main" r:id="rId3"/>
+    </p:ext>
+  </p:extLst>
 </p:sld>
 </file>
 
@@ -20804,7 +20890,7 @@
           <p:nvPr/>
         </p:nvPicPr>
         <p:blipFill>
-          <a:blip r:embed="rId3">
+          <a:blip r:embed="rId4">
             <a:extLst>
               <a:ext uri="{28A0092B-C50C-407E-A947-70E740481C1C}">
                 <a14:useLocalDpi xmlns:a14="http://schemas.microsoft.com/office/drawing/2010/main" val="0"/>
@@ -21020,6 +21106,11 @@
       </p:par>
     </p:tnLst>
   </p:timing>
+  <p:extLst>
+    <p:ext uri="{6950BFC3-D8DA-4A85-94F7-54DA5524770B}">
+      <p188:commentRel xmlns:p188="http://schemas.microsoft.com/office/powerpoint/2018/8/main" r:id="rId3"/>
+    </p:ext>
+  </p:extLst>
 </p:sld>
 </file>
 

</xml_diff>